<commit_message>
Update class diagram and sequence diagrams for logic component
</commit_message>
<xml_diff>
--- a/docs/diagrams/LogicComponentClassDiagram.pptx
+++ b/docs/diagrams/LogicComponentClassDiagram.pptx
@@ -126,10 +126,6 @@
 </p:presentation>
 </file>
 
-<file path=ppt/revisionInfo.xml><?xml version="1.0" encoding="utf-8"?>
-<p1510:revInfo xmlns:a="http://schemas.openxmlformats.org/drawingml/2006/main" xmlns:r="http://schemas.openxmlformats.org/officeDocument/2006/relationships" xmlns:p1510="http://schemas.microsoft.com/office/powerpoint/2015/10/main"/>
-</file>
-
 <file path=ppt/notesMasters/notesMaster1.xml><?xml version="1.0" encoding="utf-8"?>
 <p:notesMaster xmlns:a="http://schemas.openxmlformats.org/drawingml/2006/main" xmlns:r="http://schemas.openxmlformats.org/officeDocument/2006/relationships" xmlns:p="http://schemas.openxmlformats.org/presentationml/2006/main">
   <p:cSld>
@@ -212,7 +208,7 @@
           <a:p>
             <a:fld id="{F5CC4B3F-88C1-4FFA-B1B6-F41C21DC6924}" type="datetimeFigureOut">
               <a:rPr lang="en-US" smtClean="0"/>
-              <a:t>4/16/2018</a:t>
+              <a:t>11/12/2018</a:t>
             </a:fld>
             <a:endParaRPr lang="en-US"/>
           </a:p>
@@ -658,7 +654,7 @@
           <a:p>
             <a:fld id="{78C97017-6FC3-485B-9764-EAC9E56C1D49}" type="datetimeFigureOut">
               <a:rPr lang="en-US" smtClean="0"/>
-              <a:t>4/16/2018</a:t>
+              <a:t>11/12/2018</a:t>
             </a:fld>
             <a:endParaRPr lang="en-US"/>
           </a:p>
@@ -826,7 +822,7 @@
           <a:p>
             <a:fld id="{78C97017-6FC3-485B-9764-EAC9E56C1D49}" type="datetimeFigureOut">
               <a:rPr lang="en-US" smtClean="0"/>
-              <a:t>4/16/2018</a:t>
+              <a:t>11/12/2018</a:t>
             </a:fld>
             <a:endParaRPr lang="en-US"/>
           </a:p>
@@ -1004,7 +1000,7 @@
           <a:p>
             <a:fld id="{78C97017-6FC3-485B-9764-EAC9E56C1D49}" type="datetimeFigureOut">
               <a:rPr lang="en-US" smtClean="0"/>
-              <a:t>4/16/2018</a:t>
+              <a:t>11/12/2018</a:t>
             </a:fld>
             <a:endParaRPr lang="en-US"/>
           </a:p>
@@ -1172,7 +1168,7 @@
           <a:p>
             <a:fld id="{78C97017-6FC3-485B-9764-EAC9E56C1D49}" type="datetimeFigureOut">
               <a:rPr lang="en-US" smtClean="0"/>
-              <a:t>4/16/2018</a:t>
+              <a:t>11/12/2018</a:t>
             </a:fld>
             <a:endParaRPr lang="en-US"/>
           </a:p>
@@ -1417,7 +1413,7 @@
           <a:p>
             <a:fld id="{78C97017-6FC3-485B-9764-EAC9E56C1D49}" type="datetimeFigureOut">
               <a:rPr lang="en-US" smtClean="0"/>
-              <a:t>4/16/2018</a:t>
+              <a:t>11/12/2018</a:t>
             </a:fld>
             <a:endParaRPr lang="en-US"/>
           </a:p>
@@ -1702,7 +1698,7 @@
           <a:p>
             <a:fld id="{78C97017-6FC3-485B-9764-EAC9E56C1D49}" type="datetimeFigureOut">
               <a:rPr lang="en-US" smtClean="0"/>
-              <a:t>4/16/2018</a:t>
+              <a:t>11/12/2018</a:t>
             </a:fld>
             <a:endParaRPr lang="en-US"/>
           </a:p>
@@ -2121,7 +2117,7 @@
           <a:p>
             <a:fld id="{78C97017-6FC3-485B-9764-EAC9E56C1D49}" type="datetimeFigureOut">
               <a:rPr lang="en-US" smtClean="0"/>
-              <a:t>4/16/2018</a:t>
+              <a:t>11/12/2018</a:t>
             </a:fld>
             <a:endParaRPr lang="en-US"/>
           </a:p>
@@ -2238,7 +2234,7 @@
           <a:p>
             <a:fld id="{78C97017-6FC3-485B-9764-EAC9E56C1D49}" type="datetimeFigureOut">
               <a:rPr lang="en-US" smtClean="0"/>
-              <a:t>4/16/2018</a:t>
+              <a:t>11/12/2018</a:t>
             </a:fld>
             <a:endParaRPr lang="en-US"/>
           </a:p>
@@ -2333,7 +2329,7 @@
           <a:p>
             <a:fld id="{78C97017-6FC3-485B-9764-EAC9E56C1D49}" type="datetimeFigureOut">
               <a:rPr lang="en-US" smtClean="0"/>
-              <a:t>4/16/2018</a:t>
+              <a:t>11/12/2018</a:t>
             </a:fld>
             <a:endParaRPr lang="en-US"/>
           </a:p>
@@ -2608,7 +2604,7 @@
           <a:p>
             <a:fld id="{78C97017-6FC3-485B-9764-EAC9E56C1D49}" type="datetimeFigureOut">
               <a:rPr lang="en-US" smtClean="0"/>
-              <a:t>4/16/2018</a:t>
+              <a:t>11/12/2018</a:t>
             </a:fld>
             <a:endParaRPr lang="en-US"/>
           </a:p>
@@ -2860,7 +2856,7 @@
           <a:p>
             <a:fld id="{78C97017-6FC3-485B-9764-EAC9E56C1D49}" type="datetimeFigureOut">
               <a:rPr lang="en-US" smtClean="0"/>
-              <a:t>4/16/2018</a:t>
+              <a:t>11/12/2018</a:t>
             </a:fld>
             <a:endParaRPr lang="en-US"/>
           </a:p>
@@ -3071,7 +3067,7 @@
           <a:p>
             <a:fld id="{78C97017-6FC3-485B-9764-EAC9E56C1D49}" type="datetimeFigureOut">
               <a:rPr lang="en-US" smtClean="0"/>
-              <a:t>4/16/2018</a:t>
+              <a:t>11/12/2018</a:t>
             </a:fld>
             <a:endParaRPr lang="en-US"/>
           </a:p>
@@ -3454,8 +3450,8 @@
         </p:nvSpPr>
         <p:spPr>
           <a:xfrm>
-            <a:off x="1066800" y="914400"/>
-            <a:ext cx="7084740" cy="3733800"/>
+            <a:off x="762000" y="158120"/>
+            <a:ext cx="8134574" cy="5782620"/>
           </a:xfrm>
           <a:prstGeom prst="roundRect">
             <a:avLst>
@@ -3515,7 +3511,7 @@
         </p:nvSpPr>
         <p:spPr>
           <a:xfrm>
-            <a:off x="2095948" y="1253067"/>
+            <a:off x="1964637" y="2548840"/>
             <a:ext cx="1093635" cy="346760"/>
           </a:xfrm>
           <a:prstGeom prst="rect">
@@ -3574,7 +3570,7 @@
         </p:nvSpPr>
         <p:spPr>
           <a:xfrm flipH="1">
-            <a:off x="6878274" y="2740152"/>
+            <a:off x="6746963" y="3830197"/>
             <a:ext cx="970326" cy="346760"/>
           </a:xfrm>
           <a:prstGeom prst="rect">
@@ -3607,7 +3603,7 @@
           <a:p>
             <a:pPr algn="ctr"/>
             <a:r>
-              <a:rPr lang="en-US" sz="1050" b="1" dirty="0" err="1" smtClean="0">
+              <a:rPr lang="en-US" sz="1050" b="1" dirty="0" err="1">
                 <a:solidFill>
                   <a:srgbClr val="0070C0"/>
                 </a:solidFill>
@@ -3630,7 +3626,7 @@
         </p:nvSpPr>
         <p:spPr>
           <a:xfrm>
-            <a:off x="1782495" y="3583530"/>
+            <a:off x="1651184" y="4673575"/>
             <a:ext cx="1093635" cy="346760"/>
           </a:xfrm>
           <a:prstGeom prst="rect">
@@ -3692,8 +3688,8 @@
         </p:nvCxnSpPr>
         <p:spPr>
           <a:xfrm flipH="1" flipV="1">
-            <a:off x="3189583" y="1426447"/>
-            <a:ext cx="4559332" cy="2895973"/>
+            <a:off x="3058272" y="2722220"/>
+            <a:ext cx="4559332" cy="2690245"/>
           </a:xfrm>
           <a:prstGeom prst="bentConnector3">
             <a:avLst>
@@ -3735,7 +3731,7 @@
         </p:nvCxnSpPr>
         <p:spPr>
           <a:xfrm>
-            <a:off x="1676400" y="1423587"/>
+            <a:off x="1545089" y="2719360"/>
             <a:ext cx="419548" cy="2860"/>
           </a:xfrm>
           <a:prstGeom prst="bentConnector3">
@@ -3776,8 +3772,8 @@
         </p:nvSpPr>
         <p:spPr>
           <a:xfrm>
-            <a:off x="1103085" y="4777355"/>
-            <a:ext cx="7050315" cy="328045"/>
+            <a:off x="972883" y="6146548"/>
+            <a:ext cx="7847491" cy="328045"/>
           </a:xfrm>
           <a:prstGeom prst="roundRect">
             <a:avLst/>
@@ -3836,7 +3832,7 @@
         </p:nvSpPr>
         <p:spPr>
           <a:xfrm>
-            <a:off x="6976872" y="4149040"/>
+            <a:off x="6845561" y="5239085"/>
             <a:ext cx="772043" cy="346760"/>
           </a:xfrm>
           <a:prstGeom prst="rect">
@@ -3907,7 +3903,7 @@
         </p:nvSpPr>
         <p:spPr>
           <a:xfrm>
-            <a:off x="3255418" y="3554995"/>
+            <a:off x="3124107" y="4645040"/>
             <a:ext cx="1045323" cy="384497"/>
           </a:xfrm>
           <a:prstGeom prst="rect">
@@ -3939,12 +3935,12 @@
           <a:p>
             <a:pPr algn="ctr"/>
             <a:r>
-              <a:rPr lang="en-US" sz="1050" dirty="0" err="1" smtClean="0">
+              <a:rPr lang="en-US" sz="1050" dirty="0" err="1">
                 <a:solidFill>
                   <a:schemeClr val="bg1"/>
                 </a:solidFill>
               </a:rPr>
-              <a:t>AddressBook</a:t>
+              <a:t>SaveIt</a:t>
             </a:r>
             <a:endParaRPr lang="en-US" sz="1050" dirty="0">
               <a:solidFill>
@@ -3974,14 +3970,15 @@
         <p:nvCxnSpPr>
           <p:cNvPr id="18" name="Straight Arrow Connector 110"/>
           <p:cNvCxnSpPr>
+            <a:cxnSpLocks/>
             <a:stCxn id="12" idx="2"/>
           </p:cNvCxnSpPr>
           <p:nvPr/>
         </p:nvCxnSpPr>
         <p:spPr>
-          <a:xfrm>
-            <a:off x="7362894" y="4495800"/>
-            <a:ext cx="0" cy="281555"/>
+          <a:xfrm flipH="1">
+            <a:off x="7231582" y="5585845"/>
+            <a:ext cx="1" cy="556084"/>
           </a:xfrm>
           <a:prstGeom prst="straightConnector1">
             <a:avLst/>
@@ -4019,8 +4016,8 @@
         </p:nvSpPr>
         <p:spPr>
           <a:xfrm rot="16200000">
-            <a:off x="398120" y="2150720"/>
-            <a:ext cx="2209800" cy="346760"/>
+            <a:off x="331386" y="3305342"/>
+            <a:ext cx="2080645" cy="346760"/>
           </a:xfrm>
           <a:prstGeom prst="rect">
             <a:avLst/>
@@ -4089,7 +4086,7 @@
         </p:nvSpPr>
         <p:spPr>
           <a:xfrm>
-            <a:off x="1359039" y="3429000"/>
+            <a:off x="1227728" y="4519045"/>
             <a:ext cx="270504" cy="175523"/>
           </a:xfrm>
           <a:prstGeom prst="triangle">
@@ -4139,6 +4136,7 @@
         <p:nvCxnSpPr>
           <p:cNvPr id="21" name="Elbow Connector 63"/>
           <p:cNvCxnSpPr>
+            <a:cxnSpLocks/>
             <a:stCxn id="5" idx="1"/>
             <a:endCxn id="20" idx="3"/>
           </p:cNvCxnSpPr>
@@ -4146,7 +4144,7 @@
         </p:nvCxnSpPr>
         <p:spPr>
           <a:xfrm rot="10800000">
-            <a:off x="1494291" y="3604524"/>
+            <a:off x="1362980" y="4694569"/>
             <a:ext cx="288204" cy="152387"/>
           </a:xfrm>
           <a:prstGeom prst="bentConnector2">
@@ -4181,14 +4179,15 @@
         <p:nvCxnSpPr>
           <p:cNvPr id="23" name="Straight Arrow Connector 57"/>
           <p:cNvCxnSpPr>
+            <a:cxnSpLocks/>
             <a:stCxn id="5" idx="2"/>
           </p:cNvCxnSpPr>
           <p:nvPr/>
         </p:nvCxnSpPr>
         <p:spPr>
           <a:xfrm>
-            <a:off x="2329313" y="3930290"/>
-            <a:ext cx="1376" cy="854841"/>
+            <a:off x="2198002" y="5020335"/>
+            <a:ext cx="9566" cy="1121594"/>
           </a:xfrm>
           <a:prstGeom prst="straightConnector1">
             <a:avLst/>
@@ -4220,13 +4219,15 @@
       <p:cxnSp>
         <p:nvCxnSpPr>
           <p:cNvPr id="24" name="Elbow Connector 122"/>
-          <p:cNvCxnSpPr/>
+          <p:cNvCxnSpPr>
+            <a:cxnSpLocks/>
+          </p:cNvCxnSpPr>
           <p:nvPr/>
         </p:nvCxnSpPr>
         <p:spPr>
           <a:xfrm>
-            <a:off x="893311" y="2832505"/>
-            <a:ext cx="419548" cy="2860"/>
+            <a:off x="373062" y="3928910"/>
+            <a:ext cx="817581" cy="2860"/>
           </a:xfrm>
           <a:prstGeom prst="bentConnector3">
             <a:avLst>
@@ -4270,7 +4271,7 @@
         </p:nvCxnSpPr>
         <p:spPr>
           <a:xfrm>
-            <a:off x="2281833" y="3939492"/>
+            <a:off x="2150522" y="5029537"/>
             <a:ext cx="4695039" cy="382928"/>
           </a:xfrm>
           <a:prstGeom prst="bentConnector3">
@@ -4311,7 +4312,7 @@
         </p:nvGrpSpPr>
         <p:grpSpPr>
           <a:xfrm>
-            <a:off x="4597400" y="4341168"/>
+            <a:off x="4466089" y="5431213"/>
             <a:ext cx="889000" cy="230832"/>
             <a:chOff x="2895600" y="807932"/>
             <a:chExt cx="889000" cy="230832"/>
@@ -4411,7 +4412,7 @@
         </p:nvGrpSpPr>
         <p:grpSpPr>
           <a:xfrm>
-            <a:off x="4665110" y="1219200"/>
+            <a:off x="4533799" y="2512368"/>
             <a:ext cx="868568" cy="230832"/>
             <a:chOff x="2755838" y="789460"/>
             <a:chExt cx="868568" cy="230832"/>
@@ -4510,7 +4511,7 @@
         </p:nvSpPr>
         <p:spPr>
           <a:xfrm>
-            <a:off x="3048000" y="3733800"/>
+            <a:off x="2916689" y="4823845"/>
             <a:ext cx="131116" cy="230832"/>
           </a:xfrm>
           <a:prstGeom prst="rect">
@@ -4544,13 +4545,15 @@
       <p:cxnSp>
         <p:nvCxnSpPr>
           <p:cNvPr id="39" name="Elbow Connector 122"/>
-          <p:cNvCxnSpPr/>
+          <p:cNvCxnSpPr>
+            <a:cxnSpLocks/>
+          </p:cNvCxnSpPr>
           <p:nvPr/>
         </p:nvCxnSpPr>
         <p:spPr>
           <a:xfrm rot="5400000" flipH="1" flipV="1">
-            <a:off x="1193276" y="2601868"/>
-            <a:ext cx="1969553" cy="2764"/>
+            <a:off x="1147874" y="3780584"/>
+            <a:ext cx="1794974" cy="2"/>
           </a:xfrm>
           <a:prstGeom prst="bentConnector3">
             <a:avLst>
@@ -4590,7 +4593,7 @@
         </p:nvSpPr>
         <p:spPr>
           <a:xfrm>
-            <a:off x="3174214" y="1862795"/>
+            <a:off x="3042903" y="2952840"/>
             <a:ext cx="751107" cy="346760"/>
           </a:xfrm>
           <a:prstGeom prst="rect">
@@ -4670,7 +4673,7 @@
         </p:nvSpPr>
         <p:spPr>
           <a:xfrm>
-            <a:off x="2238496" y="2454481"/>
+            <a:off x="2107185" y="3544526"/>
             <a:ext cx="726243" cy="174580"/>
           </a:xfrm>
           <a:prstGeom prst="rect">
@@ -4735,7 +4738,7 @@
         </p:nvSpPr>
         <p:spPr>
           <a:xfrm>
-            <a:off x="3186326" y="2841725"/>
+            <a:off x="3055015" y="3931770"/>
             <a:ext cx="731636" cy="283820"/>
           </a:xfrm>
           <a:prstGeom prst="rect">
@@ -4800,7 +4803,7 @@
         </p:nvSpPr>
         <p:spPr>
           <a:xfrm>
-            <a:off x="3186326" y="3190882"/>
+            <a:off x="3055015" y="4280927"/>
             <a:ext cx="731636" cy="283820"/>
           </a:xfrm>
           <a:prstGeom prst="rect">
@@ -4869,7 +4872,7 @@
         </p:nvCxnSpPr>
         <p:spPr>
           <a:xfrm rot="10800000">
-            <a:off x="2601618" y="2629061"/>
+            <a:off x="2470307" y="3719106"/>
             <a:ext cx="584708" cy="354574"/>
           </a:xfrm>
           <a:prstGeom prst="bentConnector2">
@@ -4915,7 +4918,7 @@
         </p:nvCxnSpPr>
         <p:spPr>
           <a:xfrm rot="10800000" flipV="1">
-            <a:off x="2601618" y="2036175"/>
+            <a:off x="2470307" y="3126220"/>
             <a:ext cx="572596" cy="418306"/>
           </a:xfrm>
           <a:prstGeom prst="bentConnector2">
@@ -4957,7 +4960,7 @@
         </p:nvGrpSpPr>
         <p:grpSpPr>
           <a:xfrm rot="10800000">
-            <a:off x="4687086" y="3784757"/>
+            <a:off x="4555775" y="4874802"/>
             <a:ext cx="555486" cy="254462"/>
             <a:chOff x="3703306" y="644022"/>
             <a:chExt cx="555486" cy="230832"/>
@@ -5062,7 +5065,7 @@
         </p:nvSpPr>
         <p:spPr>
           <a:xfrm flipV="1">
-            <a:off x="7227643" y="3980475"/>
+            <a:off x="7096332" y="5070520"/>
             <a:ext cx="270504" cy="175523"/>
           </a:xfrm>
           <a:prstGeom prst="triangle">
@@ -5119,7 +5122,7 @@
         </p:nvCxnSpPr>
         <p:spPr>
           <a:xfrm rot="5400000" flipH="1" flipV="1">
-            <a:off x="6916385" y="3533423"/>
+            <a:off x="6785074" y="4623468"/>
             <a:ext cx="893563" cy="542"/>
           </a:xfrm>
           <a:prstGeom prst="bentConnector3">
@@ -5159,7 +5162,7 @@
         </p:nvCxnSpPr>
         <p:spPr>
           <a:xfrm flipV="1">
-            <a:off x="6066328" y="2913532"/>
+            <a:off x="5935017" y="4003577"/>
             <a:ext cx="811946" cy="659"/>
           </a:xfrm>
           <a:prstGeom prst="bentConnector3">
@@ -5202,7 +5205,7 @@
         </p:nvSpPr>
         <p:spPr>
           <a:xfrm>
-            <a:off x="3174214" y="2370131"/>
+            <a:off x="3042903" y="3460176"/>
             <a:ext cx="750156" cy="340758"/>
           </a:xfrm>
           <a:prstGeom prst="rect">
@@ -5281,7 +5284,7 @@
         </p:nvCxnSpPr>
         <p:spPr>
           <a:xfrm rot="10800000" flipV="1">
-            <a:off x="2964740" y="2540509"/>
+            <a:off x="2833429" y="3630554"/>
             <a:ext cx="209475" cy="1261"/>
           </a:xfrm>
           <a:prstGeom prst="bentConnector3">
@@ -5329,7 +5332,7 @@
         </p:nvCxnSpPr>
         <p:spPr>
           <a:xfrm rot="5400000">
-            <a:off x="3469242" y="2289605"/>
+            <a:off x="3337931" y="3379650"/>
             <a:ext cx="160576" cy="476"/>
           </a:xfrm>
           <a:prstGeom prst="bentConnector3">
@@ -5373,7 +5376,7 @@
         </p:nvSpPr>
         <p:spPr>
           <a:xfrm>
-            <a:off x="1295065" y="4183424"/>
+            <a:off x="1163754" y="5273469"/>
             <a:ext cx="805984" cy="346760"/>
           </a:xfrm>
           <a:prstGeom prst="rect">
@@ -5443,7 +5446,7 @@
         </p:nvCxnSpPr>
         <p:spPr>
           <a:xfrm>
-            <a:off x="1971157" y="3939492"/>
+            <a:off x="1839846" y="5029537"/>
             <a:ext cx="2022" cy="240622"/>
           </a:xfrm>
           <a:prstGeom prst="straightConnector1">
@@ -5481,7 +5484,7 @@
         </p:nvSpPr>
         <p:spPr>
           <a:xfrm>
-            <a:off x="1773980" y="4000395"/>
+            <a:off x="1642669" y="5090440"/>
             <a:ext cx="131116" cy="230832"/>
           </a:xfrm>
           <a:prstGeom prst="rect">
@@ -5526,7 +5529,7 @@
         </p:nvSpPr>
         <p:spPr>
           <a:xfrm flipH="1">
-            <a:off x="5067626" y="1981200"/>
+            <a:off x="4936315" y="3071245"/>
             <a:ext cx="998702" cy="346760"/>
           </a:xfrm>
           <a:prstGeom prst="rect">
@@ -5592,7 +5595,7 @@
         </p:nvSpPr>
         <p:spPr>
           <a:xfrm flipH="1">
-            <a:off x="5431725" y="2327960"/>
+            <a:off x="5300414" y="3418005"/>
             <a:ext cx="270504" cy="175523"/>
           </a:xfrm>
           <a:prstGeom prst="triangle">
@@ -5637,7 +5640,7 @@
         </p:nvGrpSpPr>
         <p:grpSpPr>
           <a:xfrm rot="5400000">
-            <a:off x="6371505" y="2788428"/>
+            <a:off x="6240194" y="3878473"/>
             <a:ext cx="222304" cy="598286"/>
             <a:chOff x="3965759" y="592436"/>
             <a:chExt cx="254462" cy="503902"/>
@@ -5742,7 +5745,7 @@
         </p:nvCxnSpPr>
         <p:spPr>
           <a:xfrm>
-            <a:off x="2893971" y="3687139"/>
+            <a:off x="2762660" y="4777184"/>
             <a:ext cx="361447" cy="0"/>
           </a:xfrm>
           <a:prstGeom prst="line">
@@ -5781,7 +5784,7 @@
         </p:nvSpPr>
         <p:spPr>
           <a:xfrm flipH="1">
-            <a:off x="5074342" y="2740811"/>
+            <a:off x="4943031" y="3830856"/>
             <a:ext cx="991986" cy="346760"/>
           </a:xfrm>
           <a:prstGeom prst="rect">
@@ -5815,7 +5818,7 @@
           <a:p>
             <a:pPr algn="ctr"/>
             <a:r>
-              <a:rPr lang="en-US" sz="1050" b="1" dirty="0" err="1" smtClean="0">
+              <a:rPr lang="en-US" sz="1050" b="1" dirty="0" err="1">
                 <a:solidFill>
                   <a:schemeClr val="bg1"/>
                 </a:solidFill>
@@ -5857,7 +5860,7 @@
         </p:nvCxnSpPr>
         <p:spPr>
           <a:xfrm rot="10800000">
-            <a:off x="3917734" y="2058661"/>
+            <a:off x="3786423" y="3148706"/>
             <a:ext cx="1156608" cy="855530"/>
           </a:xfrm>
           <a:prstGeom prst="bentConnector3">
@@ -5904,7 +5907,7 @@
         </p:nvCxnSpPr>
         <p:spPr>
           <a:xfrm rot="10800000">
-            <a:off x="3921964" y="2540511"/>
+            <a:off x="3790653" y="3630556"/>
             <a:ext cx="1152379" cy="373681"/>
           </a:xfrm>
           <a:prstGeom prst="bentConnector3">
@@ -5951,7 +5954,7 @@
         </p:nvCxnSpPr>
         <p:spPr>
           <a:xfrm rot="10800000" flipV="1">
-            <a:off x="3926192" y="2914191"/>
+            <a:off x="3794881" y="4004236"/>
             <a:ext cx="1148150" cy="108168"/>
           </a:xfrm>
           <a:prstGeom prst="bentConnector3">
@@ -5998,7 +6001,7 @@
         </p:nvCxnSpPr>
         <p:spPr>
           <a:xfrm rot="10800000" flipV="1">
-            <a:off x="3930422" y="2914191"/>
+            <a:off x="3799111" y="4004236"/>
             <a:ext cx="1143921" cy="439870"/>
           </a:xfrm>
           <a:prstGeom prst="bentConnector3">
@@ -6045,7 +6048,7 @@
         </p:nvCxnSpPr>
         <p:spPr>
           <a:xfrm flipV="1">
-            <a:off x="4300741" y="3087571"/>
+            <a:off x="4169430" y="4177616"/>
             <a:ext cx="1269594" cy="659673"/>
           </a:xfrm>
           <a:prstGeom prst="bentConnector2">
@@ -6088,7 +6091,7 @@
         </p:nvCxnSpPr>
         <p:spPr>
           <a:xfrm rot="16200000" flipH="1">
-            <a:off x="5451193" y="2621669"/>
+            <a:off x="5319882" y="3711714"/>
             <a:ext cx="234926" cy="3358"/>
           </a:xfrm>
           <a:prstGeom prst="bentConnector3">
@@ -6126,7 +6129,7 @@
         </p:nvSpPr>
         <p:spPr>
           <a:xfrm>
-            <a:off x="6263130" y="1981200"/>
+            <a:off x="6131819" y="3071245"/>
             <a:ext cx="1276614" cy="630473"/>
           </a:xfrm>
           <a:prstGeom prst="foldedCorner">
@@ -6165,7 +6168,7 @@
           <a:p>
             <a:pPr algn="ctr"/>
             <a:r>
-              <a:rPr lang="en-US" sz="1050" dirty="0" err="1" smtClean="0">
+              <a:rPr lang="en-US" sz="1050" dirty="0" err="1">
                 <a:solidFill>
                   <a:schemeClr val="bg1"/>
                 </a:solidFill>
@@ -6173,7 +6176,7 @@
               <a:t>XYZCommand</a:t>
             </a:r>
             <a:r>
-              <a:rPr lang="en-US" sz="1050" dirty="0" smtClean="0">
+              <a:rPr lang="en-US" sz="1050" dirty="0">
                 <a:solidFill>
                   <a:schemeClr val="bg1"/>
                 </a:solidFill>
@@ -6181,7 +6184,7 @@
               <a:t> = </a:t>
             </a:r>
             <a:r>
-              <a:rPr lang="en-US" sz="1050" dirty="0" err="1" smtClean="0">
+              <a:rPr lang="en-US" sz="1050" dirty="0" err="1">
                 <a:solidFill>
                   <a:schemeClr val="bg1"/>
                 </a:solidFill>
@@ -6189,7 +6192,7 @@
               <a:t>AddCommand</a:t>
             </a:r>
             <a:r>
-              <a:rPr lang="en-US" sz="1050" dirty="0" smtClean="0">
+              <a:rPr lang="en-US" sz="1050" dirty="0">
                 <a:solidFill>
                   <a:schemeClr val="bg1"/>
                 </a:solidFill>
@@ -6197,7 +6200,7 @@
               <a:t>, </a:t>
             </a:r>
             <a:r>
-              <a:rPr lang="en-US" sz="1050" dirty="0" err="1" smtClean="0">
+              <a:rPr lang="en-US" sz="1050" dirty="0" err="1">
                 <a:solidFill>
                   <a:schemeClr val="bg1"/>
                 </a:solidFill>
@@ -6205,14 +6208,213 @@
               <a:t>FindCommand</a:t>
             </a:r>
             <a:r>
-              <a:rPr lang="en-US" sz="1050" dirty="0" smtClean="0">
+              <a:rPr lang="en-US" sz="1050" dirty="0">
                 <a:solidFill>
                   <a:schemeClr val="bg1"/>
                 </a:solidFill>
               </a:rPr>
               <a:t>, etc.</a:t>
             </a:r>
-            <a:endParaRPr lang="en-US" sz="1050" dirty="0">
+          </a:p>
+        </p:txBody>
+      </p:sp>
+      <p:sp>
+        <p:nvSpPr>
+          <p:cNvPr id="59" name="Rectangle 65">
+            <a:extLst>
+              <a:ext uri="{FF2B5EF4-FFF2-40B4-BE49-F238E27FC236}">
+                <a16:creationId xmlns:a16="http://schemas.microsoft.com/office/drawing/2014/main" id="{E4B27470-5D01-4DF9-ACFA-82671402DB08}"/>
+              </a:ext>
+            </a:extLst>
+          </p:cNvPr>
+          <p:cNvSpPr/>
+          <p:nvPr/>
+        </p:nvSpPr>
+        <p:spPr>
+          <a:xfrm>
+            <a:off x="895574" y="2133600"/>
+            <a:ext cx="7086600" cy="3680284"/>
+          </a:xfrm>
+          <a:prstGeom prst="roundRect">
+            <a:avLst>
+              <a:gd name="adj" fmla="val 3484"/>
+            </a:avLst>
+          </a:prstGeom>
+          <a:noFill/>
+          <a:ln w="19050">
+            <a:solidFill>
+              <a:srgbClr val="00B0F0"/>
+            </a:solidFill>
+          </a:ln>
+          <a:effectLst/>
+        </p:spPr>
+        <p:style>
+          <a:lnRef idx="1">
+            <a:schemeClr val="accent2"/>
+          </a:lnRef>
+          <a:fillRef idx="2">
+            <a:schemeClr val="accent2"/>
+          </a:fillRef>
+          <a:effectRef idx="1">
+            <a:schemeClr val="accent2"/>
+          </a:effectRef>
+          <a:fontRef idx="minor">
+            <a:schemeClr val="dk1"/>
+          </a:fontRef>
+        </p:style>
+        <p:txBody>
+          <a:bodyPr rtlCol="0" anchor="t"/>
+          <a:lstStyle/>
+          <a:p>
+            <a:r>
+              <a:rPr lang="en-US" sz="1200" b="1" dirty="0">
+                <a:solidFill>
+                  <a:srgbClr val="0070C0"/>
+                </a:solidFill>
+              </a:rPr>
+              <a:t>Command Logic</a:t>
+            </a:r>
+            <a:endParaRPr lang="en-SG" sz="1200" b="1" dirty="0">
+              <a:solidFill>
+                <a:srgbClr val="0070C0"/>
+              </a:solidFill>
+            </a:endParaRPr>
+          </a:p>
+        </p:txBody>
+      </p:sp>
+      <p:sp>
+        <p:nvSpPr>
+          <p:cNvPr id="63" name="Rectangle 65">
+            <a:extLst>
+              <a:ext uri="{FF2B5EF4-FFF2-40B4-BE49-F238E27FC236}">
+                <a16:creationId xmlns:a16="http://schemas.microsoft.com/office/drawing/2014/main" id="{C4509512-03CC-487D-B0AA-7C7D1BC798BE}"/>
+              </a:ext>
+            </a:extLst>
+          </p:cNvPr>
+          <p:cNvSpPr/>
+          <p:nvPr/>
+        </p:nvSpPr>
+        <p:spPr>
+          <a:xfrm>
+            <a:off x="895574" y="539870"/>
+            <a:ext cx="7848600" cy="1519817"/>
+          </a:xfrm>
+          <a:prstGeom prst="roundRect">
+            <a:avLst>
+              <a:gd name="adj" fmla="val 3484"/>
+            </a:avLst>
+          </a:prstGeom>
+          <a:noFill/>
+          <a:ln w="19050">
+            <a:solidFill>
+              <a:srgbClr val="00B0F0"/>
+            </a:solidFill>
+          </a:ln>
+          <a:effectLst/>
+        </p:spPr>
+        <p:style>
+          <a:lnRef idx="1">
+            <a:schemeClr val="accent2"/>
+          </a:lnRef>
+          <a:fillRef idx="2">
+            <a:schemeClr val="accent2"/>
+          </a:fillRef>
+          <a:effectRef idx="1">
+            <a:schemeClr val="accent2"/>
+          </a:effectRef>
+          <a:fontRef idx="minor">
+            <a:schemeClr val="dk1"/>
+          </a:fontRef>
+        </p:style>
+        <p:txBody>
+          <a:bodyPr rtlCol="0" anchor="t"/>
+          <a:lstStyle/>
+          <a:p>
+            <a:r>
+              <a:rPr lang="en-US" sz="1200" b="1" dirty="0">
+                <a:solidFill>
+                  <a:srgbClr val="0070C0"/>
+                </a:solidFill>
+              </a:rPr>
+              <a:t>Suggestion Logic</a:t>
+            </a:r>
+            <a:endParaRPr lang="en-SG" sz="1200" b="1" dirty="0">
+              <a:solidFill>
+                <a:srgbClr val="0070C0"/>
+              </a:solidFill>
+            </a:endParaRPr>
+          </a:p>
+        </p:txBody>
+      </p:sp>
+      <p:sp>
+        <p:nvSpPr>
+          <p:cNvPr id="65" name="Rectangle 62">
+            <a:extLst>
+              <a:ext uri="{FF2B5EF4-FFF2-40B4-BE49-F238E27FC236}">
+                <a16:creationId xmlns:a16="http://schemas.microsoft.com/office/drawing/2014/main" id="{C50A6DE7-03EC-45E5-A405-0C769AAE2B72}"/>
+              </a:ext>
+            </a:extLst>
+          </p:cNvPr>
+          <p:cNvSpPr/>
+          <p:nvPr/>
+        </p:nvSpPr>
+        <p:spPr>
+          <a:xfrm>
+            <a:off x="1198328" y="882611"/>
+            <a:ext cx="1425444" cy="346760"/>
+          </a:xfrm>
+          <a:prstGeom prst="rect">
+            <a:avLst/>
+          </a:prstGeom>
+          <a:solidFill>
+            <a:srgbClr val="0070C0"/>
+          </a:solidFill>
+          <a:ln w="19050">
+            <a:solidFill>
+              <a:srgbClr val="0070C0"/>
+            </a:solidFill>
+          </a:ln>
+          <a:effectLst/>
+        </p:spPr>
+        <p:style>
+          <a:lnRef idx="1">
+            <a:schemeClr val="accent2"/>
+          </a:lnRef>
+          <a:fillRef idx="2">
+            <a:schemeClr val="accent2"/>
+          </a:fillRef>
+          <a:effectRef idx="1">
+            <a:schemeClr val="accent2"/>
+          </a:effectRef>
+          <a:fontRef idx="minor">
+            <a:schemeClr val="dk1"/>
+          </a:fontRef>
+        </p:style>
+        <p:txBody>
+          <a:bodyPr rtlCol="0" anchor="ctr"/>
+          <a:lstStyle/>
+          <a:p>
+            <a:pPr algn="ctr"/>
+            <a:r>
+              <a:rPr lang="en-US" sz="1050" dirty="0">
+                <a:solidFill>
+                  <a:schemeClr val="bg1"/>
+                </a:solidFill>
+              </a:rPr>
+              <a:t>&lt;&lt;interface&gt;&gt;</a:t>
+            </a:r>
+          </a:p>
+          <a:p>
+            <a:pPr algn="ctr"/>
+            <a:r>
+              <a:rPr lang="en-US" sz="1050" dirty="0">
+                <a:solidFill>
+                  <a:schemeClr val="bg1"/>
+                </a:solidFill>
+              </a:rPr>
+              <a:t>SuggestionLogic</a:t>
+            </a:r>
+            <a:endParaRPr lang="en-SG" sz="1050" dirty="0">
               <a:solidFill>
                 <a:schemeClr val="bg1"/>
               </a:solidFill>
@@ -6220,6 +6422,1076 @@
           </a:p>
         </p:txBody>
       </p:sp>
+      <p:cxnSp>
+        <p:nvCxnSpPr>
+          <p:cNvPr id="66" name="Elbow Connector 122">
+            <a:extLst>
+              <a:ext uri="{FF2B5EF4-FFF2-40B4-BE49-F238E27FC236}">
+                <a16:creationId xmlns:a16="http://schemas.microsoft.com/office/drawing/2014/main" id="{77046501-76F7-42F6-8224-4030B2A4C0BC}"/>
+              </a:ext>
+            </a:extLst>
+          </p:cNvPr>
+          <p:cNvCxnSpPr>
+            <a:cxnSpLocks/>
+          </p:cNvCxnSpPr>
+          <p:nvPr/>
+        </p:nvCxnSpPr>
+        <p:spPr>
+          <a:xfrm>
+            <a:off x="371251" y="1066480"/>
+            <a:ext cx="817581" cy="2860"/>
+          </a:xfrm>
+          <a:prstGeom prst="bentConnector3">
+            <a:avLst>
+              <a:gd name="adj1" fmla="val 50000"/>
+            </a:avLst>
+          </a:prstGeom>
+          <a:ln w="19050">
+            <a:solidFill>
+              <a:schemeClr val="bg1">
+                <a:lumMod val="75000"/>
+              </a:schemeClr>
+            </a:solidFill>
+            <a:prstDash val="sysDot"/>
+            <a:headEnd type="none" w="med" len="med"/>
+            <a:tailEnd type="arrow" w="med" len="med"/>
+          </a:ln>
+          <a:effectLst/>
+        </p:spPr>
+        <p:style>
+          <a:lnRef idx="1">
+            <a:schemeClr val="accent2"/>
+          </a:lnRef>
+          <a:fillRef idx="2">
+            <a:schemeClr val="accent2"/>
+          </a:fillRef>
+          <a:effectRef idx="1">
+            <a:schemeClr val="accent2"/>
+          </a:effectRef>
+          <a:fontRef idx="minor">
+            <a:schemeClr val="dk1"/>
+          </a:fontRef>
+        </p:style>
+      </p:cxnSp>
+      <p:sp>
+        <p:nvSpPr>
+          <p:cNvPr id="71" name="Isosceles Triangle 102">
+            <a:extLst>
+              <a:ext uri="{FF2B5EF4-FFF2-40B4-BE49-F238E27FC236}">
+                <a16:creationId xmlns:a16="http://schemas.microsoft.com/office/drawing/2014/main" id="{30FF086D-106B-436A-8B63-31E134189B7B}"/>
+              </a:ext>
+            </a:extLst>
+          </p:cNvPr>
+          <p:cNvSpPr/>
+          <p:nvPr/>
+        </p:nvSpPr>
+        <p:spPr>
+          <a:xfrm rot="16200000">
+            <a:off x="2605170" y="994573"/>
+            <a:ext cx="270504" cy="175523"/>
+          </a:xfrm>
+          <a:prstGeom prst="triangle">
+            <a:avLst/>
+          </a:prstGeom>
+          <a:solidFill>
+            <a:schemeClr val="tx2">
+              <a:lumMod val="60000"/>
+              <a:lumOff val="40000"/>
+            </a:schemeClr>
+          </a:solidFill>
+          <a:ln w="19050">
+            <a:solidFill>
+              <a:srgbClr val="0070C0"/>
+            </a:solidFill>
+          </a:ln>
+          <a:effectLst/>
+        </p:spPr>
+        <p:style>
+          <a:lnRef idx="1">
+            <a:schemeClr val="accent1"/>
+          </a:lnRef>
+          <a:fillRef idx="2">
+            <a:schemeClr val="accent1"/>
+          </a:fillRef>
+          <a:effectRef idx="1">
+            <a:schemeClr val="accent1"/>
+          </a:effectRef>
+          <a:fontRef idx="minor">
+            <a:schemeClr val="dk1"/>
+          </a:fontRef>
+        </p:style>
+        <p:txBody>
+          <a:bodyPr rtlCol="0" anchor="ctr"/>
+          <a:lstStyle/>
+          <a:p>
+            <a:pPr algn="ctr"/>
+            <a:endParaRPr lang="en-SG" sz="1050" b="1" dirty="0">
+              <a:solidFill>
+                <a:srgbClr val="92D050"/>
+              </a:solidFill>
+            </a:endParaRPr>
+          </a:p>
+        </p:txBody>
+      </p:sp>
+      <p:cxnSp>
+        <p:nvCxnSpPr>
+          <p:cNvPr id="72" name="Elbow Connector 63">
+            <a:extLst>
+              <a:ext uri="{FF2B5EF4-FFF2-40B4-BE49-F238E27FC236}">
+                <a16:creationId xmlns:a16="http://schemas.microsoft.com/office/drawing/2014/main" id="{18A0BB38-0913-4C4C-BF27-EC1F913E7070}"/>
+              </a:ext>
+            </a:extLst>
+          </p:cNvPr>
+          <p:cNvCxnSpPr>
+            <a:cxnSpLocks/>
+          </p:cNvCxnSpPr>
+          <p:nvPr/>
+        </p:nvCxnSpPr>
+        <p:spPr>
+          <a:xfrm rot="10800000" flipV="1">
+            <a:off x="2833428" y="806448"/>
+            <a:ext cx="705904" cy="289478"/>
+          </a:xfrm>
+          <a:prstGeom prst="bentConnector3">
+            <a:avLst>
+              <a:gd name="adj1" fmla="val 50000"/>
+            </a:avLst>
+          </a:prstGeom>
+          <a:ln w="19050">
+            <a:solidFill>
+              <a:srgbClr val="0070C0"/>
+            </a:solidFill>
+            <a:prstDash val="sysDot"/>
+            <a:headEnd type="none" w="med" len="med"/>
+            <a:tailEnd type="none" w="med" len="med"/>
+          </a:ln>
+          <a:effectLst/>
+        </p:spPr>
+        <p:style>
+          <a:lnRef idx="1">
+            <a:schemeClr val="accent2"/>
+          </a:lnRef>
+          <a:fillRef idx="2">
+            <a:schemeClr val="accent2"/>
+          </a:fillRef>
+          <a:effectRef idx="1">
+            <a:schemeClr val="accent2"/>
+          </a:effectRef>
+          <a:fontRef idx="minor">
+            <a:schemeClr val="dk1"/>
+          </a:fontRef>
+        </p:style>
+      </p:cxnSp>
+      <p:sp>
+        <p:nvSpPr>
+          <p:cNvPr id="73" name="Rectangle 62">
+            <a:extLst>
+              <a:ext uri="{FF2B5EF4-FFF2-40B4-BE49-F238E27FC236}">
+                <a16:creationId xmlns:a16="http://schemas.microsoft.com/office/drawing/2014/main" id="{D605F7BF-B3C6-4DF3-B8B0-54C5AAA75786}"/>
+              </a:ext>
+            </a:extLst>
+          </p:cNvPr>
+          <p:cNvSpPr/>
+          <p:nvPr/>
+        </p:nvSpPr>
+        <p:spPr>
+          <a:xfrm>
+            <a:off x="3515689" y="644518"/>
+            <a:ext cx="1839400" cy="346760"/>
+          </a:xfrm>
+          <a:prstGeom prst="rect">
+            <a:avLst/>
+          </a:prstGeom>
+          <a:solidFill>
+            <a:srgbClr val="0070C0"/>
+          </a:solidFill>
+          <a:ln w="19050">
+            <a:solidFill>
+              <a:srgbClr val="0070C0"/>
+            </a:solidFill>
+          </a:ln>
+          <a:effectLst/>
+        </p:spPr>
+        <p:style>
+          <a:lnRef idx="1">
+            <a:schemeClr val="accent2"/>
+          </a:lnRef>
+          <a:fillRef idx="2">
+            <a:schemeClr val="accent2"/>
+          </a:fillRef>
+          <a:effectRef idx="1">
+            <a:schemeClr val="accent2"/>
+          </a:effectRef>
+          <a:fontRef idx="minor">
+            <a:schemeClr val="dk1"/>
+          </a:fontRef>
+        </p:style>
+        <p:txBody>
+          <a:bodyPr rtlCol="0" anchor="ctr"/>
+          <a:lstStyle/>
+          <a:p>
+            <a:pPr algn="ctr"/>
+            <a:r>
+              <a:rPr lang="en-US" sz="1050" dirty="0" err="1">
+                <a:solidFill>
+                  <a:schemeClr val="bg1"/>
+                </a:solidFill>
+              </a:rPr>
+              <a:t>SuggestionLogicManager</a:t>
+            </a:r>
+            <a:endParaRPr lang="en-SG" sz="1050" dirty="0">
+              <a:solidFill>
+                <a:schemeClr val="bg1"/>
+              </a:solidFill>
+            </a:endParaRPr>
+          </a:p>
+        </p:txBody>
+      </p:sp>
+      <p:sp>
+        <p:nvSpPr>
+          <p:cNvPr id="76" name="Rectangle 11">
+            <a:extLst>
+              <a:ext uri="{FF2B5EF4-FFF2-40B4-BE49-F238E27FC236}">
+                <a16:creationId xmlns:a16="http://schemas.microsoft.com/office/drawing/2014/main" id="{369A9915-0BC7-4E01-B780-C5AB6A3F6C1C}"/>
+              </a:ext>
+            </a:extLst>
+          </p:cNvPr>
+          <p:cNvSpPr/>
+          <p:nvPr/>
+        </p:nvSpPr>
+        <p:spPr>
+          <a:xfrm flipH="1">
+            <a:off x="6959782" y="643840"/>
+            <a:ext cx="1041218" cy="346760"/>
+          </a:xfrm>
+          <a:prstGeom prst="rect">
+            <a:avLst/>
+          </a:prstGeom>
+          <a:ln w="19050">
+            <a:solidFill>
+              <a:srgbClr val="0070C0"/>
+            </a:solidFill>
+          </a:ln>
+          <a:effectLst/>
+        </p:spPr>
+        <p:style>
+          <a:lnRef idx="1">
+            <a:schemeClr val="accent1"/>
+          </a:lnRef>
+          <a:fillRef idx="2">
+            <a:schemeClr val="accent1"/>
+          </a:fillRef>
+          <a:effectRef idx="1">
+            <a:schemeClr val="accent1"/>
+          </a:effectRef>
+          <a:fontRef idx="minor">
+            <a:schemeClr val="dk1"/>
+          </a:fontRef>
+        </p:style>
+        <p:txBody>
+          <a:bodyPr rtlCol="0" anchor="ctr"/>
+          <a:lstStyle/>
+          <a:p>
+            <a:pPr algn="ctr"/>
+            <a:r>
+              <a:rPr lang="en-US" sz="1050" b="1" dirty="0" err="1">
+                <a:solidFill>
+                  <a:srgbClr val="0070C0"/>
+                </a:solidFill>
+              </a:rPr>
+              <a:t>XYZSuggestion</a:t>
+            </a:r>
+            <a:endParaRPr lang="en-SG" sz="1050" b="1" dirty="0">
+              <a:solidFill>
+                <a:srgbClr val="0070C0"/>
+              </a:solidFill>
+            </a:endParaRPr>
+          </a:p>
+        </p:txBody>
+      </p:sp>
+      <p:cxnSp>
+        <p:nvCxnSpPr>
+          <p:cNvPr id="77" name="Elbow Connector 63">
+            <a:extLst>
+              <a:ext uri="{FF2B5EF4-FFF2-40B4-BE49-F238E27FC236}">
+                <a16:creationId xmlns:a16="http://schemas.microsoft.com/office/drawing/2014/main" id="{04765354-6366-4797-BA54-041D25E3199B}"/>
+              </a:ext>
+            </a:extLst>
+          </p:cNvPr>
+          <p:cNvCxnSpPr>
+            <a:cxnSpLocks/>
+            <a:endCxn id="100" idx="1"/>
+          </p:cNvCxnSpPr>
+          <p:nvPr/>
+        </p:nvCxnSpPr>
+        <p:spPr>
+          <a:xfrm>
+            <a:off x="5355089" y="917260"/>
+            <a:ext cx="1590909" cy="648452"/>
+          </a:xfrm>
+          <a:prstGeom prst="bentConnector3">
+            <a:avLst>
+              <a:gd name="adj1" fmla="val 65267"/>
+            </a:avLst>
+          </a:prstGeom>
+          <a:ln w="19050">
+            <a:solidFill>
+              <a:srgbClr val="0070C0"/>
+            </a:solidFill>
+            <a:prstDash val="sysDot"/>
+            <a:headEnd type="none" w="med" len="med"/>
+            <a:tailEnd type="arrow" w="med" len="med"/>
+          </a:ln>
+          <a:effectLst/>
+        </p:spPr>
+        <p:style>
+          <a:lnRef idx="1">
+            <a:schemeClr val="accent2"/>
+          </a:lnRef>
+          <a:fillRef idx="2">
+            <a:schemeClr val="accent2"/>
+          </a:fillRef>
+          <a:effectRef idx="1">
+            <a:schemeClr val="accent2"/>
+          </a:effectRef>
+          <a:fontRef idx="minor">
+            <a:schemeClr val="dk1"/>
+          </a:fontRef>
+        </p:style>
+      </p:cxnSp>
+      <p:grpSp>
+        <p:nvGrpSpPr>
+          <p:cNvPr id="78" name="Group 77">
+            <a:extLst>
+              <a:ext uri="{FF2B5EF4-FFF2-40B4-BE49-F238E27FC236}">
+                <a16:creationId xmlns:a16="http://schemas.microsoft.com/office/drawing/2014/main" id="{BAE94F5E-0189-4B87-8C58-F747FA643CDA}"/>
+              </a:ext>
+            </a:extLst>
+          </p:cNvPr>
+          <p:cNvGrpSpPr/>
+          <p:nvPr/>
+        </p:nvGrpSpPr>
+        <p:grpSpPr>
+          <a:xfrm>
+            <a:off x="5397036" y="975084"/>
+            <a:ext cx="889000" cy="230832"/>
+            <a:chOff x="2895600" y="807932"/>
+            <a:chExt cx="889000" cy="230832"/>
+          </a:xfrm>
+        </p:grpSpPr>
+        <p:sp>
+          <p:nvSpPr>
+            <p:cNvPr id="79" name="TextBox 78">
+              <a:extLst>
+                <a:ext uri="{FF2B5EF4-FFF2-40B4-BE49-F238E27FC236}">
+                  <a16:creationId xmlns:a16="http://schemas.microsoft.com/office/drawing/2014/main" id="{C4F0271B-4898-4164-A220-16AF44D253CF}"/>
+                </a:ext>
+              </a:extLst>
+            </p:cNvPr>
+            <p:cNvSpPr txBox="1"/>
+            <p:nvPr/>
+          </p:nvSpPr>
+          <p:spPr>
+            <a:xfrm>
+              <a:off x="2895600" y="807932"/>
+              <a:ext cx="728806" cy="230832"/>
+            </a:xfrm>
+            <a:prstGeom prst="rect">
+              <a:avLst/>
+            </a:prstGeom>
+            <a:noFill/>
+          </p:spPr>
+          <p:txBody>
+            <a:bodyPr wrap="square" lIns="0" tIns="0" rIns="0" bIns="0" rtlCol="0">
+              <a:noAutofit/>
+            </a:bodyPr>
+            <a:lstStyle/>
+            <a:p>
+              <a:pPr algn="r"/>
+              <a:r>
+                <a:rPr lang="en-US" sz="1100" dirty="0">
+                  <a:solidFill>
+                    <a:srgbClr val="0070C0"/>
+                  </a:solidFill>
+                </a:rPr>
+                <a:t>evaluates</a:t>
+              </a:r>
+              <a:endParaRPr lang="en-SG" sz="1100" dirty="0">
+                <a:solidFill>
+                  <a:srgbClr val="0070C0"/>
+                </a:solidFill>
+              </a:endParaRPr>
+            </a:p>
+          </p:txBody>
+        </p:sp>
+        <p:sp>
+          <p:nvSpPr>
+            <p:cNvPr id="80" name="Isosceles Triangle 79">
+              <a:extLst>
+                <a:ext uri="{FF2B5EF4-FFF2-40B4-BE49-F238E27FC236}">
+                  <a16:creationId xmlns:a16="http://schemas.microsoft.com/office/drawing/2014/main" id="{54342CA9-A5B7-45E4-BC6D-52CB487F7C3A}"/>
+                </a:ext>
+              </a:extLst>
+            </p:cNvPr>
+            <p:cNvSpPr/>
+            <p:nvPr/>
+          </p:nvSpPr>
+          <p:spPr>
+            <a:xfrm rot="5400000">
+              <a:off x="3683524" y="866776"/>
+              <a:ext cx="125951" cy="76201"/>
+            </a:xfrm>
+            <a:prstGeom prst="triangle">
+              <a:avLst/>
+            </a:prstGeom>
+            <a:solidFill>
+              <a:srgbClr val="0070C0"/>
+            </a:solidFill>
+            <a:ln>
+              <a:noFill/>
+            </a:ln>
+          </p:spPr>
+          <p:style>
+            <a:lnRef idx="2">
+              <a:schemeClr val="accent1">
+                <a:shade val="50000"/>
+              </a:schemeClr>
+            </a:lnRef>
+            <a:fillRef idx="1">
+              <a:schemeClr val="accent1"/>
+            </a:fillRef>
+            <a:effectRef idx="0">
+              <a:schemeClr val="accent1"/>
+            </a:effectRef>
+            <a:fontRef idx="minor">
+              <a:schemeClr val="lt1"/>
+            </a:fontRef>
+          </p:style>
+          <p:txBody>
+            <a:bodyPr rtlCol="0" anchor="ctr"/>
+            <a:lstStyle/>
+            <a:p>
+              <a:pPr algn="ctr"/>
+              <a:endParaRPr lang="en-SG"/>
+            </a:p>
+          </p:txBody>
+        </p:sp>
+      </p:grpSp>
+      <p:cxnSp>
+        <p:nvCxnSpPr>
+          <p:cNvPr id="90" name="Elbow Connector 122">
+            <a:extLst>
+              <a:ext uri="{FF2B5EF4-FFF2-40B4-BE49-F238E27FC236}">
+                <a16:creationId xmlns:a16="http://schemas.microsoft.com/office/drawing/2014/main" id="{89D736E9-4238-4D00-B92B-14F48F3D4B1F}"/>
+              </a:ext>
+            </a:extLst>
+          </p:cNvPr>
+          <p:cNvCxnSpPr>
+            <a:cxnSpLocks/>
+            <a:stCxn id="73" idx="3"/>
+            <a:endCxn id="76" idx="3"/>
+          </p:cNvCxnSpPr>
+          <p:nvPr/>
+        </p:nvCxnSpPr>
+        <p:spPr>
+          <a:xfrm flipV="1">
+            <a:off x="5355089" y="817220"/>
+            <a:ext cx="1604693" cy="678"/>
+          </a:xfrm>
+          <a:prstGeom prst="bentConnector3">
+            <a:avLst>
+              <a:gd name="adj1" fmla="val 50000"/>
+            </a:avLst>
+          </a:prstGeom>
+          <a:ln w="19050">
+            <a:solidFill>
+              <a:srgbClr val="0070C0"/>
+            </a:solidFill>
+            <a:prstDash val="sysDot"/>
+            <a:headEnd type="none" w="med" len="med"/>
+            <a:tailEnd type="arrow" w="med" len="med"/>
+          </a:ln>
+          <a:effectLst/>
+        </p:spPr>
+        <p:style>
+          <a:lnRef idx="1">
+            <a:schemeClr val="accent2"/>
+          </a:lnRef>
+          <a:fillRef idx="2">
+            <a:schemeClr val="accent2"/>
+          </a:fillRef>
+          <a:effectRef idx="1">
+            <a:schemeClr val="accent2"/>
+          </a:effectRef>
+          <a:fontRef idx="minor">
+            <a:schemeClr val="dk1"/>
+          </a:fontRef>
+        </p:style>
+      </p:cxnSp>
+      <p:sp>
+        <p:nvSpPr>
+          <p:cNvPr id="98" name="Isosceles Triangle 102">
+            <a:extLst>
+              <a:ext uri="{FF2B5EF4-FFF2-40B4-BE49-F238E27FC236}">
+                <a16:creationId xmlns:a16="http://schemas.microsoft.com/office/drawing/2014/main" id="{74069834-2B15-4A00-AA33-97E7E5DCE6AF}"/>
+              </a:ext>
+            </a:extLst>
+          </p:cNvPr>
+          <p:cNvSpPr/>
+          <p:nvPr/>
+        </p:nvSpPr>
+        <p:spPr>
+          <a:xfrm flipV="1">
+            <a:off x="7327288" y="1240037"/>
+            <a:ext cx="270504" cy="145061"/>
+          </a:xfrm>
+          <a:prstGeom prst="triangle">
+            <a:avLst/>
+          </a:prstGeom>
+          <a:solidFill>
+            <a:schemeClr val="tx2">
+              <a:lumMod val="60000"/>
+              <a:lumOff val="40000"/>
+            </a:schemeClr>
+          </a:solidFill>
+          <a:ln w="19050">
+            <a:solidFill>
+              <a:srgbClr val="0070C0"/>
+            </a:solidFill>
+          </a:ln>
+          <a:effectLst/>
+        </p:spPr>
+        <p:style>
+          <a:lnRef idx="1">
+            <a:schemeClr val="accent1"/>
+          </a:lnRef>
+          <a:fillRef idx="2">
+            <a:schemeClr val="accent1"/>
+          </a:fillRef>
+          <a:effectRef idx="1">
+            <a:schemeClr val="accent1"/>
+          </a:effectRef>
+          <a:fontRef idx="minor">
+            <a:schemeClr val="dk1"/>
+          </a:fontRef>
+        </p:style>
+        <p:txBody>
+          <a:bodyPr rtlCol="0" anchor="ctr"/>
+          <a:lstStyle/>
+          <a:p>
+            <a:pPr algn="ctr"/>
+            <a:endParaRPr lang="en-SG" sz="1050" b="1">
+              <a:solidFill>
+                <a:srgbClr val="92D050"/>
+              </a:solidFill>
+            </a:endParaRPr>
+          </a:p>
+        </p:txBody>
+      </p:sp>
+      <p:cxnSp>
+        <p:nvCxnSpPr>
+          <p:cNvPr id="99" name="Elbow Connector 95">
+            <a:extLst>
+              <a:ext uri="{FF2B5EF4-FFF2-40B4-BE49-F238E27FC236}">
+                <a16:creationId xmlns:a16="http://schemas.microsoft.com/office/drawing/2014/main" id="{66EDA8C1-9A31-458C-9BC3-37C2E4ABB612}"/>
+              </a:ext>
+            </a:extLst>
+          </p:cNvPr>
+          <p:cNvCxnSpPr>
+            <a:cxnSpLocks/>
+            <a:stCxn id="98" idx="3"/>
+          </p:cNvCxnSpPr>
+          <p:nvPr/>
+        </p:nvCxnSpPr>
+        <p:spPr>
+          <a:xfrm rot="5400000" flipH="1" flipV="1">
+            <a:off x="7338200" y="1115695"/>
+            <a:ext cx="248682" cy="2"/>
+          </a:xfrm>
+          <a:prstGeom prst="bentConnector3">
+            <a:avLst>
+              <a:gd name="adj1" fmla="val 50000"/>
+            </a:avLst>
+          </a:prstGeom>
+          <a:ln w="19050">
+            <a:headEnd type="none" w="med" len="med"/>
+            <a:tailEnd type="none" w="med" len="med"/>
+          </a:ln>
+        </p:spPr>
+        <p:style>
+          <a:lnRef idx="1">
+            <a:schemeClr val="accent1"/>
+          </a:lnRef>
+          <a:fillRef idx="0">
+            <a:schemeClr val="accent1"/>
+          </a:fillRef>
+          <a:effectRef idx="0">
+            <a:schemeClr val="accent1"/>
+          </a:effectRef>
+          <a:fontRef idx="minor">
+            <a:schemeClr val="tx1"/>
+          </a:fontRef>
+        </p:style>
+      </p:cxnSp>
+      <p:sp>
+        <p:nvSpPr>
+          <p:cNvPr id="100" name="Rectangle 62">
+            <a:extLst>
+              <a:ext uri="{FF2B5EF4-FFF2-40B4-BE49-F238E27FC236}">
+                <a16:creationId xmlns:a16="http://schemas.microsoft.com/office/drawing/2014/main" id="{E3F4CC1D-B8F7-4323-A3D7-79A07BFD5C34}"/>
+              </a:ext>
+            </a:extLst>
+          </p:cNvPr>
+          <p:cNvSpPr/>
+          <p:nvPr/>
+        </p:nvSpPr>
+        <p:spPr>
+          <a:xfrm>
+            <a:off x="6945998" y="1392332"/>
+            <a:ext cx="1015831" cy="346760"/>
+          </a:xfrm>
+          <a:prstGeom prst="rect">
+            <a:avLst/>
+          </a:prstGeom>
+          <a:solidFill>
+            <a:srgbClr val="0070C0"/>
+          </a:solidFill>
+          <a:ln w="19050">
+            <a:solidFill>
+              <a:srgbClr val="0070C0"/>
+            </a:solidFill>
+          </a:ln>
+          <a:effectLst/>
+        </p:spPr>
+        <p:style>
+          <a:lnRef idx="1">
+            <a:schemeClr val="accent2"/>
+          </a:lnRef>
+          <a:fillRef idx="2">
+            <a:schemeClr val="accent2"/>
+          </a:fillRef>
+          <a:effectRef idx="1">
+            <a:schemeClr val="accent2"/>
+          </a:effectRef>
+          <a:fontRef idx="minor">
+            <a:schemeClr val="dk1"/>
+          </a:fontRef>
+        </p:style>
+        <p:txBody>
+          <a:bodyPr rtlCol="0" anchor="ctr"/>
+          <a:lstStyle/>
+          <a:p>
+            <a:pPr algn="ctr"/>
+            <a:r>
+              <a:rPr lang="en-US" sz="1050" dirty="0">
+                <a:solidFill>
+                  <a:schemeClr val="bg1"/>
+                </a:solidFill>
+              </a:rPr>
+              <a:t>&lt;&lt;interface&gt;&gt;</a:t>
+            </a:r>
+          </a:p>
+          <a:p>
+            <a:pPr algn="ctr"/>
+            <a:r>
+              <a:rPr lang="en-US" sz="1050" dirty="0">
+                <a:solidFill>
+                  <a:schemeClr val="bg1"/>
+                </a:solidFill>
+              </a:rPr>
+              <a:t>Suggestion</a:t>
+            </a:r>
+            <a:endParaRPr lang="en-SG" sz="1050" dirty="0">
+              <a:solidFill>
+                <a:schemeClr val="bg1"/>
+              </a:solidFill>
+            </a:endParaRPr>
+          </a:p>
+        </p:txBody>
+      </p:sp>
+      <p:cxnSp>
+        <p:nvCxnSpPr>
+          <p:cNvPr id="105" name="Elbow Connector 63">
+            <a:extLst>
+              <a:ext uri="{FF2B5EF4-FFF2-40B4-BE49-F238E27FC236}">
+                <a16:creationId xmlns:a16="http://schemas.microsoft.com/office/drawing/2014/main" id="{D24353EF-2087-4EC2-AA1E-8A19AB0D9373}"/>
+              </a:ext>
+            </a:extLst>
+          </p:cNvPr>
+          <p:cNvCxnSpPr>
+            <a:cxnSpLocks/>
+            <a:stCxn id="100" idx="3"/>
+          </p:cNvCxnSpPr>
+          <p:nvPr/>
+        </p:nvCxnSpPr>
+        <p:spPr>
+          <a:xfrm>
+            <a:off x="7961829" y="1565712"/>
+            <a:ext cx="484070" cy="4576217"/>
+          </a:xfrm>
+          <a:prstGeom prst="bentConnector2">
+            <a:avLst/>
+          </a:prstGeom>
+          <a:ln w="19050">
+            <a:solidFill>
+              <a:srgbClr val="0070C0"/>
+            </a:solidFill>
+            <a:prstDash val="sysDot"/>
+            <a:headEnd type="none" w="med" len="med"/>
+            <a:tailEnd type="arrow" w="med" len="med"/>
+          </a:ln>
+          <a:effectLst/>
+        </p:spPr>
+        <p:style>
+          <a:lnRef idx="1">
+            <a:schemeClr val="accent2"/>
+          </a:lnRef>
+          <a:fillRef idx="2">
+            <a:schemeClr val="accent2"/>
+          </a:fillRef>
+          <a:effectRef idx="1">
+            <a:schemeClr val="accent2"/>
+          </a:effectRef>
+          <a:fontRef idx="minor">
+            <a:schemeClr val="dk1"/>
+          </a:fontRef>
+        </p:style>
+      </p:cxnSp>
+      <p:cxnSp>
+        <p:nvCxnSpPr>
+          <p:cNvPr id="119" name="Elbow Connector 122">
+            <a:extLst>
+              <a:ext uri="{FF2B5EF4-FFF2-40B4-BE49-F238E27FC236}">
+                <a16:creationId xmlns:a16="http://schemas.microsoft.com/office/drawing/2014/main" id="{077AE313-7312-48AE-B686-979134457D07}"/>
+              </a:ext>
+            </a:extLst>
+          </p:cNvPr>
+          <p:cNvCxnSpPr>
+            <a:cxnSpLocks/>
+            <a:stCxn id="65" idx="2"/>
+          </p:cNvCxnSpPr>
+          <p:nvPr/>
+        </p:nvCxnSpPr>
+        <p:spPr>
+          <a:xfrm rot="16200000" flipH="1">
+            <a:off x="1927998" y="1212423"/>
+            <a:ext cx="380230" cy="414126"/>
+          </a:xfrm>
+          <a:prstGeom prst="bentConnector2">
+            <a:avLst/>
+          </a:prstGeom>
+          <a:ln w="19050">
+            <a:solidFill>
+              <a:srgbClr val="0070C0"/>
+            </a:solidFill>
+            <a:prstDash val="sysDot"/>
+            <a:headEnd type="none" w="med" len="med"/>
+            <a:tailEnd type="arrow" w="med" len="med"/>
+          </a:ln>
+          <a:effectLst/>
+        </p:spPr>
+        <p:style>
+          <a:lnRef idx="1">
+            <a:schemeClr val="accent2"/>
+          </a:lnRef>
+          <a:fillRef idx="2">
+            <a:schemeClr val="accent2"/>
+          </a:fillRef>
+          <a:effectRef idx="1">
+            <a:schemeClr val="accent2"/>
+          </a:effectRef>
+          <a:fontRef idx="minor">
+            <a:schemeClr val="dk1"/>
+          </a:fontRef>
+        </p:style>
+      </p:cxnSp>
+      <p:sp>
+        <p:nvSpPr>
+          <p:cNvPr id="120" name="Rectangle 8">
+            <a:extLst>
+              <a:ext uri="{FF2B5EF4-FFF2-40B4-BE49-F238E27FC236}">
+                <a16:creationId xmlns:a16="http://schemas.microsoft.com/office/drawing/2014/main" id="{53570B88-60FC-426F-A58E-EF20637BDFE3}"/>
+              </a:ext>
+            </a:extLst>
+          </p:cNvPr>
+          <p:cNvSpPr/>
+          <p:nvPr/>
+        </p:nvSpPr>
+        <p:spPr>
+          <a:xfrm>
+            <a:off x="2319235" y="1429052"/>
+            <a:ext cx="1093635" cy="346760"/>
+          </a:xfrm>
+          <a:prstGeom prst="rect">
+            <a:avLst/>
+          </a:prstGeom>
+          <a:solidFill>
+            <a:srgbClr val="0070C0"/>
+          </a:solidFill>
+          <a:ln w="19050">
+            <a:solidFill>
+              <a:srgbClr val="0070C0"/>
+            </a:solidFill>
+          </a:ln>
+          <a:effectLst/>
+        </p:spPr>
+        <p:style>
+          <a:lnRef idx="1">
+            <a:schemeClr val="accent2"/>
+          </a:lnRef>
+          <a:fillRef idx="2">
+            <a:schemeClr val="accent2"/>
+          </a:fillRef>
+          <a:effectRef idx="1">
+            <a:schemeClr val="accent2"/>
+          </a:effectRef>
+          <a:fontRef idx="minor">
+            <a:schemeClr val="dk1"/>
+          </a:fontRef>
+        </p:style>
+        <p:txBody>
+          <a:bodyPr rtlCol="0" anchor="ctr"/>
+          <a:lstStyle/>
+          <a:p>
+            <a:pPr algn="ctr"/>
+            <a:r>
+              <a:rPr lang="en-US" sz="1050" dirty="0" err="1">
+                <a:solidFill>
+                  <a:schemeClr val="bg1"/>
+                </a:solidFill>
+              </a:rPr>
+              <a:t>CommandResult</a:t>
+            </a:r>
+            <a:endParaRPr lang="en-SG" sz="1050" dirty="0">
+              <a:solidFill>
+                <a:schemeClr val="bg1"/>
+              </a:solidFill>
+            </a:endParaRPr>
+          </a:p>
+        </p:txBody>
+      </p:sp>
+      <p:cxnSp>
+        <p:nvCxnSpPr>
+          <p:cNvPr id="121" name="Elbow Connector 122">
+            <a:extLst>
+              <a:ext uri="{FF2B5EF4-FFF2-40B4-BE49-F238E27FC236}">
+                <a16:creationId xmlns:a16="http://schemas.microsoft.com/office/drawing/2014/main" id="{93F094BA-0E01-4BAD-BBB7-49E19DFDC7EA}"/>
+              </a:ext>
+            </a:extLst>
+          </p:cNvPr>
+          <p:cNvCxnSpPr>
+            <a:cxnSpLocks/>
+            <a:stCxn id="100" idx="2"/>
+            <a:endCxn id="120" idx="3"/>
+          </p:cNvCxnSpPr>
+          <p:nvPr/>
+        </p:nvCxnSpPr>
+        <p:spPr>
+          <a:xfrm rot="5400000" flipH="1">
+            <a:off x="5365062" y="-349760"/>
+            <a:ext cx="136660" cy="4041044"/>
+          </a:xfrm>
+          <a:prstGeom prst="bentConnector4">
+            <a:avLst>
+              <a:gd name="adj1" fmla="val -149851"/>
+              <a:gd name="adj2" fmla="val 56991"/>
+            </a:avLst>
+          </a:prstGeom>
+          <a:ln w="19050">
+            <a:solidFill>
+              <a:srgbClr val="0070C0"/>
+            </a:solidFill>
+            <a:prstDash val="sysDot"/>
+            <a:headEnd type="none" w="med" len="med"/>
+            <a:tailEnd type="arrow" w="med" len="med"/>
+          </a:ln>
+          <a:effectLst/>
+        </p:spPr>
+        <p:style>
+          <a:lnRef idx="1">
+            <a:schemeClr val="accent2"/>
+          </a:lnRef>
+          <a:fillRef idx="2">
+            <a:schemeClr val="accent2"/>
+          </a:fillRef>
+          <a:effectRef idx="1">
+            <a:schemeClr val="accent2"/>
+          </a:effectRef>
+          <a:fontRef idx="minor">
+            <a:schemeClr val="dk1"/>
+          </a:fontRef>
+        </p:style>
+      </p:cxnSp>
+      <p:grpSp>
+        <p:nvGrpSpPr>
+          <p:cNvPr id="128" name="Group 127">
+            <a:extLst>
+              <a:ext uri="{FF2B5EF4-FFF2-40B4-BE49-F238E27FC236}">
+                <a16:creationId xmlns:a16="http://schemas.microsoft.com/office/drawing/2014/main" id="{8B5E3EEC-D532-40B0-9958-B9BD05AF6B76}"/>
+              </a:ext>
+            </a:extLst>
+          </p:cNvPr>
+          <p:cNvGrpSpPr/>
+          <p:nvPr/>
+        </p:nvGrpSpPr>
+        <p:grpSpPr>
+          <a:xfrm>
+            <a:off x="4389232" y="1676400"/>
+            <a:ext cx="868568" cy="230832"/>
+            <a:chOff x="2755838" y="789460"/>
+            <a:chExt cx="868568" cy="230832"/>
+          </a:xfrm>
+        </p:grpSpPr>
+        <p:sp>
+          <p:nvSpPr>
+            <p:cNvPr id="129" name="TextBox 128">
+              <a:extLst>
+                <a:ext uri="{FF2B5EF4-FFF2-40B4-BE49-F238E27FC236}">
+                  <a16:creationId xmlns:a16="http://schemas.microsoft.com/office/drawing/2014/main" id="{DB981F17-39B7-4279-BF4F-F34AE1A89CB8}"/>
+                </a:ext>
+              </a:extLst>
+            </p:cNvPr>
+            <p:cNvSpPr txBox="1"/>
+            <p:nvPr/>
+          </p:nvSpPr>
+          <p:spPr>
+            <a:xfrm>
+              <a:off x="2895600" y="789460"/>
+              <a:ext cx="728806" cy="230832"/>
+            </a:xfrm>
+            <a:prstGeom prst="rect">
+              <a:avLst/>
+            </a:prstGeom>
+            <a:noFill/>
+          </p:spPr>
+          <p:txBody>
+            <a:bodyPr wrap="square" lIns="0" tIns="0" rIns="0" bIns="0" rtlCol="0">
+              <a:noAutofit/>
+            </a:bodyPr>
+            <a:lstStyle/>
+            <a:p>
+              <a:r>
+                <a:rPr lang="en-US" sz="1100" dirty="0">
+                  <a:solidFill>
+                    <a:srgbClr val="0070C0"/>
+                  </a:solidFill>
+                </a:rPr>
+                <a:t>produces</a:t>
+              </a:r>
+              <a:endParaRPr lang="en-SG" sz="1100" dirty="0">
+                <a:solidFill>
+                  <a:srgbClr val="0070C0"/>
+                </a:solidFill>
+              </a:endParaRPr>
+            </a:p>
+          </p:txBody>
+        </p:sp>
+        <p:sp>
+          <p:nvSpPr>
+            <p:cNvPr id="130" name="Isosceles Triangle 129">
+              <a:extLst>
+                <a:ext uri="{FF2B5EF4-FFF2-40B4-BE49-F238E27FC236}">
+                  <a16:creationId xmlns:a16="http://schemas.microsoft.com/office/drawing/2014/main" id="{9416B2D7-D3DB-4EDD-848C-96F0EB7004B2}"/>
+                </a:ext>
+              </a:extLst>
+            </p:cNvPr>
+            <p:cNvSpPr/>
+            <p:nvPr/>
+          </p:nvSpPr>
+          <p:spPr>
+            <a:xfrm rot="16200000" flipH="1">
+              <a:off x="2730963" y="857181"/>
+              <a:ext cx="125951" cy="76201"/>
+            </a:xfrm>
+            <a:prstGeom prst="triangle">
+              <a:avLst/>
+            </a:prstGeom>
+            <a:solidFill>
+              <a:srgbClr val="0070C0"/>
+            </a:solidFill>
+            <a:ln>
+              <a:noFill/>
+            </a:ln>
+          </p:spPr>
+          <p:style>
+            <a:lnRef idx="2">
+              <a:schemeClr val="accent1">
+                <a:shade val="50000"/>
+              </a:schemeClr>
+            </a:lnRef>
+            <a:fillRef idx="1">
+              <a:schemeClr val="accent1"/>
+            </a:fillRef>
+            <a:effectRef idx="0">
+              <a:schemeClr val="accent1"/>
+            </a:effectRef>
+            <a:fontRef idx="minor">
+              <a:schemeClr val="lt1"/>
+            </a:fontRef>
+          </p:style>
+          <p:txBody>
+            <a:bodyPr rtlCol="0" anchor="ctr"/>
+            <a:lstStyle/>
+            <a:p>
+              <a:pPr algn="ctr"/>
+              <a:endParaRPr lang="en-SG"/>
+            </a:p>
+          </p:txBody>
+        </p:sp>
+      </p:grpSp>
+      <p:cxnSp>
+        <p:nvCxnSpPr>
+          <p:cNvPr id="131" name="Elbow Connector 12">
+            <a:extLst>
+              <a:ext uri="{FF2B5EF4-FFF2-40B4-BE49-F238E27FC236}">
+                <a16:creationId xmlns:a16="http://schemas.microsoft.com/office/drawing/2014/main" id="{004FD525-3312-4E5A-99A0-9CE421D1CAC4}"/>
+              </a:ext>
+            </a:extLst>
+          </p:cNvPr>
+          <p:cNvCxnSpPr>
+            <a:cxnSpLocks/>
+            <a:endCxn id="56" idx="0"/>
+          </p:cNvCxnSpPr>
+          <p:nvPr/>
+        </p:nvCxnSpPr>
+        <p:spPr>
+          <a:xfrm rot="5400000">
+            <a:off x="2707827" y="1703652"/>
+            <a:ext cx="1959818" cy="538558"/>
+          </a:xfrm>
+          <a:prstGeom prst="bentConnector3">
+            <a:avLst>
+              <a:gd name="adj1" fmla="val 50000"/>
+            </a:avLst>
+          </a:prstGeom>
+          <a:ln w="19050">
+            <a:solidFill>
+              <a:schemeClr val="accent5">
+                <a:lumMod val="60000"/>
+                <a:lumOff val="40000"/>
+              </a:schemeClr>
+            </a:solidFill>
+            <a:prstDash val="sysDot"/>
+            <a:headEnd type="none" w="med" len="med"/>
+            <a:tailEnd type="arrow" w="med" len="med"/>
+          </a:ln>
+          <a:effectLst/>
+        </p:spPr>
+        <p:style>
+          <a:lnRef idx="1">
+            <a:schemeClr val="accent2"/>
+          </a:lnRef>
+          <a:fillRef idx="2">
+            <a:schemeClr val="accent2"/>
+          </a:fillRef>
+          <a:effectRef idx="1">
+            <a:schemeClr val="accent2"/>
+          </a:effectRef>
+          <a:fontRef idx="minor">
+            <a:schemeClr val="dk1"/>
+          </a:fontRef>
+        </p:style>
+      </p:cxnSp>
     </p:spTree>
     <p:extLst>
       <p:ext uri="{BB962C8B-B14F-4D97-AF65-F5344CB8AC3E}">

</xml_diff>